<commit_message>
Ajout sur power point
Ajout power point sur les besoins
</commit_message>
<xml_diff>
--- a/Pres. Projet.pptx
+++ b/Pres. Projet.pptx
@@ -167,10 +167,9 @@
           </a:lstStyle>
           <a:p>
             <a:r>
-              <a:rPr lang="fr-FR" smtClean="0"/>
+              <a:rPr lang="fr-FR"/>
               <a:t>Modifiez le style du titre</a:t>
             </a:r>
-            <a:endParaRPr lang="fr-FR"/>
           </a:p>
         </p:txBody>
       </p:sp>
@@ -232,10 +231,9 @@
           </a:lstStyle>
           <a:p>
             <a:r>
-              <a:rPr lang="fr-FR" smtClean="0"/>
+              <a:rPr lang="fr-FR"/>
               <a:t>Modifier le style des sous-titres du masque</a:t>
             </a:r>
-            <a:endParaRPr lang="fr-FR"/>
           </a:p>
         </p:txBody>
       </p:sp>
@@ -350,10 +348,9 @@
           <a:lstStyle/>
           <a:p>
             <a:r>
-              <a:rPr lang="fr-FR" smtClean="0"/>
+              <a:rPr lang="fr-FR"/>
               <a:t>Modifiez le style du titre</a:t>
             </a:r>
-            <a:endParaRPr lang="fr-FR"/>
           </a:p>
         </p:txBody>
       </p:sp>
@@ -374,38 +371,37 @@
           <a:p>
             <a:pPr lvl="0"/>
             <a:r>
-              <a:rPr lang="fr-FR" smtClean="0"/>
+              <a:rPr lang="fr-FR"/>
               <a:t>Modifier les styles du texte du masque</a:t>
             </a:r>
           </a:p>
           <a:p>
             <a:pPr lvl="1"/>
             <a:r>
-              <a:rPr lang="fr-FR" smtClean="0"/>
+              <a:rPr lang="fr-FR"/>
               <a:t>Deuxième niveau</a:t>
             </a:r>
           </a:p>
           <a:p>
             <a:pPr lvl="2"/>
             <a:r>
-              <a:rPr lang="fr-FR" smtClean="0"/>
+              <a:rPr lang="fr-FR"/>
               <a:t>Troisième niveau</a:t>
             </a:r>
           </a:p>
           <a:p>
             <a:pPr lvl="3"/>
             <a:r>
-              <a:rPr lang="fr-FR" smtClean="0"/>
+              <a:rPr lang="fr-FR"/>
               <a:t>Quatrième niveau</a:t>
             </a:r>
           </a:p>
           <a:p>
             <a:pPr lvl="4"/>
             <a:r>
-              <a:rPr lang="fr-FR" smtClean="0"/>
+              <a:rPr lang="fr-FR"/>
               <a:t>Cinquième niveau</a:t>
             </a:r>
-            <a:endParaRPr lang="fr-FR"/>
           </a:p>
         </p:txBody>
       </p:sp>
@@ -525,10 +521,9 @@
           <a:lstStyle/>
           <a:p>
             <a:r>
-              <a:rPr lang="fr-FR" smtClean="0"/>
+              <a:rPr lang="fr-FR"/>
               <a:t>Modifiez le style du titre</a:t>
             </a:r>
-            <a:endParaRPr lang="fr-FR"/>
           </a:p>
         </p:txBody>
       </p:sp>
@@ -554,38 +549,37 @@
           <a:p>
             <a:pPr lvl="0"/>
             <a:r>
-              <a:rPr lang="fr-FR" smtClean="0"/>
+              <a:rPr lang="fr-FR"/>
               <a:t>Modifier les styles du texte du masque</a:t>
             </a:r>
           </a:p>
           <a:p>
             <a:pPr lvl="1"/>
             <a:r>
-              <a:rPr lang="fr-FR" smtClean="0"/>
+              <a:rPr lang="fr-FR"/>
               <a:t>Deuxième niveau</a:t>
             </a:r>
           </a:p>
           <a:p>
             <a:pPr lvl="2"/>
             <a:r>
-              <a:rPr lang="fr-FR" smtClean="0"/>
+              <a:rPr lang="fr-FR"/>
               <a:t>Troisième niveau</a:t>
             </a:r>
           </a:p>
           <a:p>
             <a:pPr lvl="3"/>
             <a:r>
-              <a:rPr lang="fr-FR" smtClean="0"/>
+              <a:rPr lang="fr-FR"/>
               <a:t>Quatrième niveau</a:t>
             </a:r>
           </a:p>
           <a:p>
             <a:pPr lvl="4"/>
             <a:r>
-              <a:rPr lang="fr-FR" smtClean="0"/>
+              <a:rPr lang="fr-FR"/>
               <a:t>Cinquième niveau</a:t>
             </a:r>
-            <a:endParaRPr lang="fr-FR"/>
           </a:p>
         </p:txBody>
       </p:sp>
@@ -700,10 +694,9 @@
           <a:lstStyle/>
           <a:p>
             <a:r>
-              <a:rPr lang="fr-FR" smtClean="0"/>
+              <a:rPr lang="fr-FR"/>
               <a:t>Modifiez le style du titre</a:t>
             </a:r>
-            <a:endParaRPr lang="fr-FR"/>
           </a:p>
         </p:txBody>
       </p:sp>
@@ -724,38 +717,37 @@
           <a:p>
             <a:pPr lvl="0"/>
             <a:r>
-              <a:rPr lang="fr-FR" smtClean="0"/>
+              <a:rPr lang="fr-FR"/>
               <a:t>Modifier les styles du texte du masque</a:t>
             </a:r>
           </a:p>
           <a:p>
             <a:pPr lvl="1"/>
             <a:r>
-              <a:rPr lang="fr-FR" smtClean="0"/>
+              <a:rPr lang="fr-FR"/>
               <a:t>Deuxième niveau</a:t>
             </a:r>
           </a:p>
           <a:p>
             <a:pPr lvl="2"/>
             <a:r>
-              <a:rPr lang="fr-FR" smtClean="0"/>
+              <a:rPr lang="fr-FR"/>
               <a:t>Troisième niveau</a:t>
             </a:r>
           </a:p>
           <a:p>
             <a:pPr lvl="3"/>
             <a:r>
-              <a:rPr lang="fr-FR" smtClean="0"/>
+              <a:rPr lang="fr-FR"/>
               <a:t>Quatrième niveau</a:t>
             </a:r>
           </a:p>
           <a:p>
             <a:pPr lvl="4"/>
             <a:r>
-              <a:rPr lang="fr-FR" smtClean="0"/>
+              <a:rPr lang="fr-FR"/>
               <a:t>Cinquième niveau</a:t>
             </a:r>
-            <a:endParaRPr lang="fr-FR"/>
           </a:p>
         </p:txBody>
       </p:sp>
@@ -879,10 +871,9 @@
           </a:lstStyle>
           <a:p>
             <a:r>
-              <a:rPr lang="fr-FR" smtClean="0"/>
+              <a:rPr lang="fr-FR"/>
               <a:t>Modifiez le style du titre</a:t>
             </a:r>
-            <a:endParaRPr lang="fr-FR"/>
           </a:p>
         </p:txBody>
       </p:sp>
@@ -999,7 +990,7 @@
           <a:p>
             <a:pPr lvl="0"/>
             <a:r>
-              <a:rPr lang="fr-FR" smtClean="0"/>
+              <a:rPr lang="fr-FR"/>
               <a:t>Modifier les styles du texte du masque</a:t>
             </a:r>
           </a:p>
@@ -1116,10 +1107,9 @@
           <a:lstStyle/>
           <a:p>
             <a:r>
-              <a:rPr lang="fr-FR" smtClean="0"/>
+              <a:rPr lang="fr-FR"/>
               <a:t>Modifiez le style du titre</a:t>
             </a:r>
-            <a:endParaRPr lang="fr-FR"/>
           </a:p>
         </p:txBody>
       </p:sp>
@@ -1145,38 +1135,37 @@
           <a:p>
             <a:pPr lvl="0"/>
             <a:r>
-              <a:rPr lang="fr-FR" smtClean="0"/>
+              <a:rPr lang="fr-FR"/>
               <a:t>Modifier les styles du texte du masque</a:t>
             </a:r>
           </a:p>
           <a:p>
             <a:pPr lvl="1"/>
             <a:r>
-              <a:rPr lang="fr-FR" smtClean="0"/>
+              <a:rPr lang="fr-FR"/>
               <a:t>Deuxième niveau</a:t>
             </a:r>
           </a:p>
           <a:p>
             <a:pPr lvl="2"/>
             <a:r>
-              <a:rPr lang="fr-FR" smtClean="0"/>
+              <a:rPr lang="fr-FR"/>
               <a:t>Troisième niveau</a:t>
             </a:r>
           </a:p>
           <a:p>
             <a:pPr lvl="3"/>
             <a:r>
-              <a:rPr lang="fr-FR" smtClean="0"/>
+              <a:rPr lang="fr-FR"/>
               <a:t>Quatrième niveau</a:t>
             </a:r>
           </a:p>
           <a:p>
             <a:pPr lvl="4"/>
             <a:r>
-              <a:rPr lang="fr-FR" smtClean="0"/>
+              <a:rPr lang="fr-FR"/>
               <a:t>Cinquième niveau</a:t>
             </a:r>
-            <a:endParaRPr lang="fr-FR"/>
           </a:p>
         </p:txBody>
       </p:sp>
@@ -1202,38 +1191,37 @@
           <a:p>
             <a:pPr lvl="0"/>
             <a:r>
-              <a:rPr lang="fr-FR" smtClean="0"/>
+              <a:rPr lang="fr-FR"/>
               <a:t>Modifier les styles du texte du masque</a:t>
             </a:r>
           </a:p>
           <a:p>
             <a:pPr lvl="1"/>
             <a:r>
-              <a:rPr lang="fr-FR" smtClean="0"/>
+              <a:rPr lang="fr-FR"/>
               <a:t>Deuxième niveau</a:t>
             </a:r>
           </a:p>
           <a:p>
             <a:pPr lvl="2"/>
             <a:r>
-              <a:rPr lang="fr-FR" smtClean="0"/>
+              <a:rPr lang="fr-FR"/>
               <a:t>Troisième niveau</a:t>
             </a:r>
           </a:p>
           <a:p>
             <a:pPr lvl="3"/>
             <a:r>
-              <a:rPr lang="fr-FR" smtClean="0"/>
+              <a:rPr lang="fr-FR"/>
               <a:t>Quatrième niveau</a:t>
             </a:r>
           </a:p>
           <a:p>
             <a:pPr lvl="4"/>
             <a:r>
-              <a:rPr lang="fr-FR" smtClean="0"/>
+              <a:rPr lang="fr-FR"/>
               <a:t>Cinquième niveau</a:t>
             </a:r>
-            <a:endParaRPr lang="fr-FR"/>
           </a:p>
         </p:txBody>
       </p:sp>
@@ -1353,10 +1341,9 @@
           <a:lstStyle/>
           <a:p>
             <a:r>
-              <a:rPr lang="fr-FR" smtClean="0"/>
+              <a:rPr lang="fr-FR"/>
               <a:t>Modifiez le style du titre</a:t>
             </a:r>
-            <a:endParaRPr lang="fr-FR"/>
           </a:p>
         </p:txBody>
       </p:sp>
@@ -1419,7 +1406,7 @@
           <a:p>
             <a:pPr lvl="0"/>
             <a:r>
-              <a:rPr lang="fr-FR" smtClean="0"/>
+              <a:rPr lang="fr-FR"/>
               <a:t>Modifier les styles du texte du masque</a:t>
             </a:r>
           </a:p>
@@ -1447,38 +1434,37 @@
           <a:p>
             <a:pPr lvl="0"/>
             <a:r>
-              <a:rPr lang="fr-FR" smtClean="0"/>
+              <a:rPr lang="fr-FR"/>
               <a:t>Modifier les styles du texte du masque</a:t>
             </a:r>
           </a:p>
           <a:p>
             <a:pPr lvl="1"/>
             <a:r>
-              <a:rPr lang="fr-FR" smtClean="0"/>
+              <a:rPr lang="fr-FR"/>
               <a:t>Deuxième niveau</a:t>
             </a:r>
           </a:p>
           <a:p>
             <a:pPr lvl="2"/>
             <a:r>
-              <a:rPr lang="fr-FR" smtClean="0"/>
+              <a:rPr lang="fr-FR"/>
               <a:t>Troisième niveau</a:t>
             </a:r>
           </a:p>
           <a:p>
             <a:pPr lvl="3"/>
             <a:r>
-              <a:rPr lang="fr-FR" smtClean="0"/>
+              <a:rPr lang="fr-FR"/>
               <a:t>Quatrième niveau</a:t>
             </a:r>
           </a:p>
           <a:p>
             <a:pPr lvl="4"/>
             <a:r>
-              <a:rPr lang="fr-FR" smtClean="0"/>
+              <a:rPr lang="fr-FR"/>
               <a:t>Cinquième niveau</a:t>
             </a:r>
-            <a:endParaRPr lang="fr-FR"/>
           </a:p>
         </p:txBody>
       </p:sp>
@@ -1541,7 +1527,7 @@
           <a:p>
             <a:pPr lvl="0"/>
             <a:r>
-              <a:rPr lang="fr-FR" smtClean="0"/>
+              <a:rPr lang="fr-FR"/>
               <a:t>Modifier les styles du texte du masque</a:t>
             </a:r>
           </a:p>
@@ -1569,38 +1555,37 @@
           <a:p>
             <a:pPr lvl="0"/>
             <a:r>
-              <a:rPr lang="fr-FR" smtClean="0"/>
+              <a:rPr lang="fr-FR"/>
               <a:t>Modifier les styles du texte du masque</a:t>
             </a:r>
           </a:p>
           <a:p>
             <a:pPr lvl="1"/>
             <a:r>
-              <a:rPr lang="fr-FR" smtClean="0"/>
+              <a:rPr lang="fr-FR"/>
               <a:t>Deuxième niveau</a:t>
             </a:r>
           </a:p>
           <a:p>
             <a:pPr lvl="2"/>
             <a:r>
-              <a:rPr lang="fr-FR" smtClean="0"/>
+              <a:rPr lang="fr-FR"/>
               <a:t>Troisième niveau</a:t>
             </a:r>
           </a:p>
           <a:p>
             <a:pPr lvl="3"/>
             <a:r>
-              <a:rPr lang="fr-FR" smtClean="0"/>
+              <a:rPr lang="fr-FR"/>
               <a:t>Quatrième niveau</a:t>
             </a:r>
           </a:p>
           <a:p>
             <a:pPr lvl="4"/>
             <a:r>
-              <a:rPr lang="fr-FR" smtClean="0"/>
+              <a:rPr lang="fr-FR"/>
               <a:t>Cinquième niveau</a:t>
             </a:r>
-            <a:endParaRPr lang="fr-FR"/>
           </a:p>
         </p:txBody>
       </p:sp>
@@ -1715,10 +1700,9 @@
           <a:lstStyle/>
           <a:p>
             <a:r>
-              <a:rPr lang="fr-FR" smtClean="0"/>
+              <a:rPr lang="fr-FR"/>
               <a:t>Modifiez le style du titre</a:t>
             </a:r>
-            <a:endParaRPr lang="fr-FR"/>
           </a:p>
         </p:txBody>
       </p:sp>
@@ -1937,10 +1921,9 @@
           </a:lstStyle>
           <a:p>
             <a:r>
-              <a:rPr lang="fr-FR" smtClean="0"/>
+              <a:rPr lang="fr-FR"/>
               <a:t>Modifiez le style du titre</a:t>
             </a:r>
-            <a:endParaRPr lang="fr-FR"/>
           </a:p>
         </p:txBody>
       </p:sp>
@@ -1994,38 +1977,37 @@
           <a:p>
             <a:pPr lvl="0"/>
             <a:r>
-              <a:rPr lang="fr-FR" smtClean="0"/>
+              <a:rPr lang="fr-FR"/>
               <a:t>Modifier les styles du texte du masque</a:t>
             </a:r>
           </a:p>
           <a:p>
             <a:pPr lvl="1"/>
             <a:r>
-              <a:rPr lang="fr-FR" smtClean="0"/>
+              <a:rPr lang="fr-FR"/>
               <a:t>Deuxième niveau</a:t>
             </a:r>
           </a:p>
           <a:p>
             <a:pPr lvl="2"/>
             <a:r>
-              <a:rPr lang="fr-FR" smtClean="0"/>
+              <a:rPr lang="fr-FR"/>
               <a:t>Troisième niveau</a:t>
             </a:r>
           </a:p>
           <a:p>
             <a:pPr lvl="3"/>
             <a:r>
-              <a:rPr lang="fr-FR" smtClean="0"/>
+              <a:rPr lang="fr-FR"/>
               <a:t>Quatrième niveau</a:t>
             </a:r>
           </a:p>
           <a:p>
             <a:pPr lvl="4"/>
             <a:r>
-              <a:rPr lang="fr-FR" smtClean="0"/>
+              <a:rPr lang="fr-FR"/>
               <a:t>Cinquième niveau</a:t>
             </a:r>
-            <a:endParaRPr lang="fr-FR"/>
           </a:p>
         </p:txBody>
       </p:sp>
@@ -2088,7 +2070,7 @@
           <a:p>
             <a:pPr lvl="0"/>
             <a:r>
-              <a:rPr lang="fr-FR" smtClean="0"/>
+              <a:rPr lang="fr-FR"/>
               <a:t>Modifier les styles du texte du masque</a:t>
             </a:r>
           </a:p>
@@ -2214,10 +2196,9 @@
           </a:lstStyle>
           <a:p>
             <a:r>
-              <a:rPr lang="fr-FR" smtClean="0"/>
+              <a:rPr lang="fr-FR"/>
               <a:t>Modifiez le style du titre</a:t>
             </a:r>
-            <a:endParaRPr lang="fr-FR"/>
           </a:p>
         </p:txBody>
       </p:sp>
@@ -2341,7 +2322,7 @@
           <a:p>
             <a:pPr lvl="0"/>
             <a:r>
-              <a:rPr lang="fr-FR" smtClean="0"/>
+              <a:rPr lang="fr-FR"/>
               <a:t>Modifier les styles du texte du masque</a:t>
             </a:r>
           </a:p>
@@ -2473,10 +2454,9 @@
           <a:lstStyle/>
           <a:p>
             <a:r>
-              <a:rPr lang="fr-FR" smtClean="0"/>
+              <a:rPr lang="fr-FR"/>
               <a:t>Modifiez le style du titre</a:t>
             </a:r>
-            <a:endParaRPr lang="fr-FR"/>
           </a:p>
         </p:txBody>
       </p:sp>
@@ -2507,38 +2487,37 @@
           <a:p>
             <a:pPr lvl="0"/>
             <a:r>
-              <a:rPr lang="fr-FR" smtClean="0"/>
+              <a:rPr lang="fr-FR"/>
               <a:t>Modifier les styles du texte du masque</a:t>
             </a:r>
           </a:p>
           <a:p>
             <a:pPr lvl="1"/>
             <a:r>
-              <a:rPr lang="fr-FR" smtClean="0"/>
+              <a:rPr lang="fr-FR"/>
               <a:t>Deuxième niveau</a:t>
             </a:r>
           </a:p>
           <a:p>
             <a:pPr lvl="2"/>
             <a:r>
-              <a:rPr lang="fr-FR" smtClean="0"/>
+              <a:rPr lang="fr-FR"/>
               <a:t>Troisième niveau</a:t>
             </a:r>
           </a:p>
           <a:p>
             <a:pPr lvl="3"/>
             <a:r>
-              <a:rPr lang="fr-FR" smtClean="0"/>
+              <a:rPr lang="fr-FR"/>
               <a:t>Quatrième niveau</a:t>
             </a:r>
           </a:p>
           <a:p>
             <a:pPr lvl="4"/>
             <a:r>
-              <a:rPr lang="fr-FR" smtClean="0"/>
+              <a:rPr lang="fr-FR"/>
               <a:t>Cinquième niveau</a:t>
             </a:r>
-            <a:endParaRPr lang="fr-FR"/>
           </a:p>
         </p:txBody>
       </p:sp>
@@ -3023,7 +3002,7 @@
                 <a:spcPct val="100000"/>
               </a:lnSpc>
             </a:pPr>
-            <a:endParaRPr lang="fr-FR" sz="2000" u="sng" dirty="0" smtClean="0"/>
+            <a:endParaRPr lang="fr-FR" sz="2000" u="sng" dirty="0"/>
           </a:p>
           <a:p>
             <a:pPr algn="l">
@@ -3039,7 +3018,7 @@
                 <a:spcPct val="100000"/>
               </a:lnSpc>
             </a:pPr>
-            <a:endParaRPr lang="fr-FR" sz="2000" u="sng" dirty="0" smtClean="0"/>
+            <a:endParaRPr lang="fr-FR" sz="2000" u="sng" dirty="0"/>
           </a:p>
         </p:txBody>
       </p:sp>
@@ -3192,13 +3171,6 @@
   <p:clrMapOvr>
     <a:masterClrMapping/>
   </p:clrMapOvr>
-  <p:timing>
-    <p:tnLst>
-      <p:par>
-        <p:cTn id="1" dur="indefinite" restart="never" nodeType="tmRoot"/>
-      </p:par>
-    </p:tnLst>
-  </p:timing>
 </p:sld>
 </file>
 
@@ -3290,28 +3262,12 @@
           <a:p>
             <a:pPr algn="ctr"/>
             <a:r>
-              <a:rPr lang="fr-FR" sz="4000" dirty="0" smtClean="0">
-                <a:solidFill>
-                  <a:srgbClr val="FF0000"/>
-                </a:solidFill>
-              </a:rPr>
-              <a:t>2) Diagramme de </a:t>
-            </a:r>
-            <a:r>
               <a:rPr lang="fr-FR" sz="4000" dirty="0">
                 <a:solidFill>
                   <a:srgbClr val="FF0000"/>
                 </a:solidFill>
               </a:rPr>
-              <a:t>cas d’utilisation pour l’Eco-sonde </a:t>
-            </a:r>
-            <a:r>
-              <a:rPr lang="fr-FR" sz="4000" dirty="0" smtClean="0">
-                <a:solidFill>
-                  <a:srgbClr val="FF0000"/>
-                </a:solidFill>
-              </a:rPr>
-              <a:t>de l’application mobile:</a:t>
+              <a:t>2) Diagramme de cas d’utilisation pour l’Eco-sonde de l’application mobile:</a:t>
             </a:r>
             <a:endParaRPr lang="fr-FR" sz="4000" dirty="0"/>
           </a:p>
@@ -3357,13 +3313,6 @@
   <p:clrMapOvr>
     <a:masterClrMapping/>
   </p:clrMapOvr>
-  <p:timing>
-    <p:tnLst>
-      <p:par>
-        <p:cTn id="1" dur="indefinite" restart="never" nodeType="tmRoot"/>
-      </p:par>
-    </p:tnLst>
-  </p:timing>
 </p:sld>
 </file>
 
@@ -3455,7 +3404,7 @@
           <a:p>
             <a:pPr algn="ctr"/>
             <a:r>
-              <a:rPr lang="fr-FR" sz="4000" dirty="0" smtClean="0">
+              <a:rPr lang="fr-FR" sz="4000" dirty="0">
                 <a:solidFill>
                   <a:srgbClr val="FF0000"/>
                 </a:solidFill>
@@ -3506,13 +3455,6 @@
   <p:clrMapOvr>
     <a:masterClrMapping/>
   </p:clrMapOvr>
-  <p:timing>
-    <p:tnLst>
-      <p:par>
-        <p:cTn id="1" dur="indefinite" restart="never" nodeType="tmRoot"/>
-      </p:par>
-    </p:tnLst>
-  </p:timing>
 </p:sld>
 </file>
 
@@ -3604,28 +3546,12 @@
           <a:p>
             <a:pPr algn="ctr"/>
             <a:r>
-              <a:rPr lang="fr-FR" sz="4000" dirty="0" smtClean="0">
-                <a:solidFill>
-                  <a:srgbClr val="FF0000"/>
-                </a:solidFill>
-              </a:rPr>
-              <a:t>2) Diagramme de </a:t>
-            </a:r>
-            <a:r>
               <a:rPr lang="fr-FR" sz="4000" dirty="0">
                 <a:solidFill>
                   <a:srgbClr val="FF0000"/>
                 </a:solidFill>
               </a:rPr>
-              <a:t>cas d’utilisation pour l’Eco-sonde </a:t>
-            </a:r>
-            <a:r>
-              <a:rPr lang="fr-FR" sz="4000" dirty="0" smtClean="0">
-                <a:solidFill>
-                  <a:srgbClr val="FF0000"/>
-                </a:solidFill>
-              </a:rPr>
-              <a:t>du site:</a:t>
+              <a:t>2) Diagramme de cas d’utilisation pour l’Eco-sonde du site:</a:t>
             </a:r>
             <a:endParaRPr lang="fr-FR" sz="4000" dirty="0"/>
           </a:p>
@@ -3671,13 +3597,6 @@
   <p:clrMapOvr>
     <a:masterClrMapping/>
   </p:clrMapOvr>
-  <p:timing>
-    <p:tnLst>
-      <p:par>
-        <p:cTn id="1" dur="indefinite" restart="never" nodeType="tmRoot"/>
-      </p:par>
-    </p:tnLst>
-  </p:timing>
 </p:sld>
 </file>
 
@@ -3769,7 +3688,7 @@
           <a:p>
             <a:pPr algn="ctr"/>
             <a:r>
-              <a:rPr lang="fr-FR" sz="4000" dirty="0" smtClean="0">
+              <a:rPr lang="fr-FR" sz="4000" dirty="0">
                 <a:solidFill>
                   <a:srgbClr val="FF0000"/>
                 </a:solidFill>
@@ -3820,13 +3739,6 @@
   <p:clrMapOvr>
     <a:masterClrMapping/>
   </p:clrMapOvr>
-  <p:timing>
-    <p:tnLst>
-      <p:par>
-        <p:cTn id="1" dur="indefinite" restart="never" nodeType="tmRoot"/>
-      </p:par>
-    </p:tnLst>
-  </p:timing>
 </p:sld>
 </file>
 
@@ -3923,15 +3835,7 @@
                   <a:srgbClr val="FF0000"/>
                 </a:solidFill>
               </a:rPr>
-              <a:t>4</a:t>
-            </a:r>
-            <a:r>
-              <a:rPr lang="fr-FR" sz="4000" dirty="0" smtClean="0">
-                <a:solidFill>
-                  <a:srgbClr val="FF0000"/>
-                </a:solidFill>
-              </a:rPr>
-              <a:t>) Choix de l’environnement de développement:</a:t>
+              <a:t>4) Choix de l’environnement de développement:</a:t>
             </a:r>
             <a:endParaRPr lang="fr-FR" sz="4000" dirty="0"/>
           </a:p>
@@ -4063,13 +3967,6 @@
   <p:clrMapOvr>
     <a:masterClrMapping/>
   </p:clrMapOvr>
-  <p:timing>
-    <p:tnLst>
-      <p:par>
-        <p:cTn id="1" dur="indefinite" restart="never" nodeType="tmRoot"/>
-      </p:par>
-    </p:tnLst>
-  </p:timing>
 </p:sld>
 </file>
 
@@ -4131,7 +4028,7 @@
                 <a:spcPct val="100000"/>
               </a:lnSpc>
             </a:pPr>
-            <a:endParaRPr lang="fr-FR" sz="2000" u="sng" dirty="0" smtClean="0"/>
+            <a:endParaRPr lang="fr-FR" sz="2000" u="sng" dirty="0"/>
           </a:p>
           <a:p>
             <a:pPr algn="l">
@@ -4147,7 +4044,7 @@
                 <a:spcPct val="100000"/>
               </a:lnSpc>
             </a:pPr>
-            <a:endParaRPr lang="fr-FR" sz="2000" u="sng" dirty="0" smtClean="0"/>
+            <a:endParaRPr lang="fr-FR" sz="2000" u="sng" dirty="0"/>
           </a:p>
         </p:txBody>
       </p:sp>
@@ -4193,7 +4090,7 @@
           <a:p>
             <a:pPr algn="ctr"/>
             <a:r>
-              <a:rPr lang="fr-FR" dirty="0" smtClean="0"/>
+              <a:rPr lang="fr-FR" dirty="0"/>
               <a:t>Deux agriculteurs souhaitent pouvoir consulter de manière régulière différentes données sur leurs terres par le biais de sondes dotées de capteurs qui permettent d’avoir une vision globale de la température, de l’humidité, de la luminosité …</a:t>
             </a:r>
           </a:p>
@@ -4245,7 +4142,7 @@
           <a:p>
             <a:pPr algn="ctr"/>
             <a:r>
-              <a:rPr lang="fr-FR" sz="4000" dirty="0" smtClean="0">
+              <a:rPr lang="fr-FR" sz="4000" dirty="0">
                 <a:solidFill>
                   <a:srgbClr val="FF0000"/>
                 </a:solidFill>
@@ -4818,7 +4715,7 @@
                 <a:spcPct val="100000"/>
               </a:lnSpc>
             </a:pPr>
-            <a:endParaRPr lang="fr-FR" sz="2000" u="sng" dirty="0" smtClean="0"/>
+            <a:endParaRPr lang="fr-FR" sz="2000" u="sng" dirty="0"/>
           </a:p>
           <a:p>
             <a:pPr algn="l">
@@ -4834,7 +4731,7 @@
                 <a:spcPct val="100000"/>
               </a:lnSpc>
             </a:pPr>
-            <a:endParaRPr lang="fr-FR" sz="2000" u="sng" dirty="0" smtClean="0"/>
+            <a:endParaRPr lang="fr-FR" sz="2000" u="sng" dirty="0"/>
           </a:p>
         </p:txBody>
       </p:sp>
@@ -4880,14 +4777,14 @@
           <a:p>
             <a:pPr algn="ctr"/>
             <a:r>
-              <a:rPr lang="fr-FR" dirty="0" smtClean="0"/>
+              <a:rPr lang="fr-FR" dirty="0"/>
               <a:t>Cette partie sera présentée de la manière suivante : </a:t>
             </a:r>
           </a:p>
           <a:p>
             <a:pPr algn="ctr"/>
             <a:r>
-              <a:rPr lang="fr-FR" dirty="0" smtClean="0"/>
+              <a:rPr lang="fr-FR" dirty="0"/>
               <a:t>A – Besoins des clients</a:t>
             </a:r>
           </a:p>
@@ -4895,17 +4792,13 @@
             <a:pPr algn="ctr"/>
             <a:r>
               <a:rPr lang="fr-FR" dirty="0"/>
-              <a:t>B</a:t>
-            </a:r>
-            <a:r>
-              <a:rPr lang="fr-FR" dirty="0" smtClean="0"/>
-              <a:t> – Les différentes contraintes du projet</a:t>
+              <a:t>B – Les différentes contraintes du projet</a:t>
             </a:r>
           </a:p>
           <a:p>
             <a:pPr algn="ctr"/>
             <a:r>
-              <a:rPr lang="fr-FR" dirty="0" smtClean="0"/>
+              <a:rPr lang="fr-FR" dirty="0"/>
               <a:t>C – Le point de départ du projet</a:t>
             </a:r>
           </a:p>
@@ -4953,7 +4846,7 @@
           <a:p>
             <a:pPr algn="ctr"/>
             <a:r>
-              <a:rPr lang="fr-FR" sz="4000" dirty="0" smtClean="0">
+              <a:rPr lang="fr-FR" sz="4000" dirty="0">
                 <a:solidFill>
                   <a:srgbClr val="FF0000"/>
                 </a:solidFill>
@@ -4974,13 +4867,6 @@
   <p:clrMapOvr>
     <a:masterClrMapping/>
   </p:clrMapOvr>
-  <p:timing>
-    <p:tnLst>
-      <p:par>
-        <p:cTn id="1" dur="indefinite" restart="never" nodeType="tmRoot"/>
-      </p:par>
-    </p:tnLst>
-  </p:timing>
 </p:sld>
 </file>
 
@@ -5042,7 +4928,7 @@
                 <a:spcPct val="100000"/>
               </a:lnSpc>
             </a:pPr>
-            <a:endParaRPr lang="fr-FR" sz="2000" u="sng" dirty="0" smtClean="0"/>
+            <a:endParaRPr lang="fr-FR" sz="2000" u="sng" dirty="0"/>
           </a:p>
           <a:p>
             <a:pPr algn="l">
@@ -5058,7 +4944,7 @@
                 <a:spcPct val="100000"/>
               </a:lnSpc>
             </a:pPr>
-            <a:endParaRPr lang="fr-FR" sz="2000" u="sng" dirty="0" smtClean="0"/>
+            <a:endParaRPr lang="fr-FR" sz="2000" u="sng" dirty="0"/>
           </a:p>
         </p:txBody>
       </p:sp>
@@ -5104,7 +4990,7 @@
           <a:p>
             <a:pPr algn="ctr"/>
             <a:r>
-              <a:rPr lang="fr-FR" dirty="0" smtClean="0"/>
+              <a:rPr lang="fr-FR" dirty="0"/>
               <a:t>Les clients qui sont deux agriculteurs ont émis plusieurs requêtes :  </a:t>
             </a:r>
           </a:p>
@@ -5114,20 +5000,8 @@
               <a:buChar char="-"/>
             </a:pPr>
             <a:r>
-              <a:rPr lang="fr-FR" dirty="0" smtClean="0"/>
-              <a:t>Leur propriété (champs / serres …) doit être quadrillée avec les sondes qui ont pour but relever certaines données (</a:t>
-            </a:r>
-            <a:r>
-              <a:rPr lang="fr-FR" dirty="0" err="1" smtClean="0"/>
-              <a:t>Temp</a:t>
-            </a:r>
-            <a:r>
-              <a:rPr lang="fr-FR" dirty="0" smtClean="0"/>
-              <a:t>. </a:t>
-            </a:r>
-            <a:r>
               <a:rPr lang="fr-FR" dirty="0"/>
-              <a:t>Sol, </a:t>
+              <a:t>Leur propriété (champs / serres …) doit être quadrillée avec les sondes qui ont pour but de relever certaines données (Temp. Sol, </a:t>
             </a:r>
             <a:r>
               <a:rPr lang="fr-FR" dirty="0" err="1"/>
@@ -5135,27 +5009,23 @@
             </a:r>
             <a:r>
               <a:rPr lang="fr-FR" dirty="0"/>
-              <a:t>. </a:t>
-            </a:r>
-            <a:r>
-              <a:rPr lang="fr-FR" dirty="0" smtClean="0"/>
-              <a:t>Ambiante, </a:t>
-            </a:r>
-            <a:r>
-              <a:rPr lang="fr-FR" dirty="0" err="1" smtClean="0"/>
+              <a:t>. Ambiante, </a:t>
+            </a:r>
+            <a:r>
+              <a:rPr lang="fr-FR" dirty="0" err="1"/>
               <a:t>Humid</a:t>
             </a:r>
             <a:r>
-              <a:rPr lang="fr-FR" dirty="0" smtClean="0"/>
+              <a:rPr lang="fr-FR" dirty="0"/>
               <a:t>. Sol, </a:t>
             </a:r>
             <a:r>
-              <a:rPr lang="fr-FR" dirty="0" err="1" smtClean="0"/>
+              <a:rPr lang="fr-FR" dirty="0" err="1"/>
               <a:t>Humid</a:t>
             </a:r>
             <a:r>
-              <a:rPr lang="fr-FR" dirty="0" smtClean="0"/>
-              <a:t>. Ambiante, Luminosité, Capteur niveau eau)</a:t>
+              <a:rPr lang="fr-FR" dirty="0"/>
+              <a:t>. Ambiante, Luminosité, Capteur niveau eau).</a:t>
             </a:r>
           </a:p>
           <a:p>
@@ -5164,12 +5034,32 @@
               <a:buChar char="-"/>
             </a:pPr>
             <a:r>
-              <a:rPr lang="fr-FR" dirty="0" smtClean="0"/>
-              <a:t>Une application doit être créée pour pouvoir configurer les </a:t>
-            </a:r>
-            <a:r>
-              <a:rPr lang="fr-FR" smtClean="0"/>
-              <a:t>sondes par capteur.</a:t>
+              <a:rPr lang="fr-FR" dirty="0"/>
+              <a:t>Une application doit être créée pour pouvoir configurer les sondes par capteur.</a:t>
+            </a:r>
+          </a:p>
+          <a:p>
+            <a:pPr marL="285750" indent="-285750" algn="ctr">
+              <a:buFontTx/>
+              <a:buChar char="-"/>
+            </a:pPr>
+            <a:r>
+              <a:rPr lang="fr-FR" dirty="0"/>
+              <a:t>Les sondes doivent former un réseau maillé qui les relie entre elles et qui se font passer les données jusqu’au concentrateur.</a:t>
+            </a:r>
+          </a:p>
+          <a:p>
+            <a:pPr marL="285750" indent="-285750" algn="ctr">
+              <a:buFontTx/>
+              <a:buChar char="-"/>
+            </a:pPr>
+            <a:r>
+              <a:rPr lang="fr-FR" dirty="0"/>
+              <a:t>Les clients doivent pouvoir vérifier les données depuis un </a:t>
+            </a:r>
+            <a:r>
+              <a:rPr lang="fr-FR"/>
+              <a:t>site internet.</a:t>
             </a:r>
             <a:endParaRPr lang="fr-FR" dirty="0"/>
           </a:p>
@@ -5217,7 +5107,7 @@
           <a:p>
             <a:pPr algn="ctr"/>
             <a:r>
-              <a:rPr lang="fr-FR" sz="4000" dirty="0" smtClean="0">
+              <a:rPr lang="fr-FR" sz="4000" dirty="0">
                 <a:solidFill>
                   <a:srgbClr val="FF0000"/>
                 </a:solidFill>
@@ -5238,13 +5128,6 @@
   <p:clrMapOvr>
     <a:masterClrMapping/>
   </p:clrMapOvr>
-  <p:timing>
-    <p:tnLst>
-      <p:par>
-        <p:cTn id="1" dur="indefinite" restart="never" nodeType="tmRoot"/>
-      </p:par>
-    </p:tnLst>
-  </p:timing>
 </p:sld>
 </file>
 
@@ -5306,7 +5189,7 @@
                 <a:spcPct val="100000"/>
               </a:lnSpc>
             </a:pPr>
-            <a:endParaRPr lang="fr-FR" sz="2000" u="sng" dirty="0" smtClean="0"/>
+            <a:endParaRPr lang="fr-FR" sz="2000" u="sng" dirty="0"/>
           </a:p>
           <a:p>
             <a:pPr algn="l">
@@ -5322,7 +5205,7 @@
                 <a:spcPct val="100000"/>
               </a:lnSpc>
             </a:pPr>
-            <a:endParaRPr lang="fr-FR" sz="2000" u="sng" dirty="0" smtClean="0"/>
+            <a:endParaRPr lang="fr-FR" sz="2000" u="sng" dirty="0"/>
           </a:p>
         </p:txBody>
       </p:sp>
@@ -5368,30 +5251,30 @@
           <a:p>
             <a:pPr algn="ctr"/>
             <a:r>
-              <a:rPr lang="fr-FR" u="sng" dirty="0" smtClean="0"/>
+              <a:rPr lang="fr-FR" u="sng" dirty="0"/>
               <a:t>Dans le projet </a:t>
             </a:r>
             <a:r>
-              <a:rPr lang="fr-FR" u="sng" dirty="0" err="1" smtClean="0"/>
+              <a:rPr lang="fr-FR" u="sng" dirty="0" err="1"/>
               <a:t>EcoProbes</a:t>
             </a:r>
             <a:r>
-              <a:rPr lang="fr-FR" u="sng" dirty="0" smtClean="0"/>
+              <a:rPr lang="fr-FR" u="sng" dirty="0"/>
               <a:t>, plusieurs contraintes apparaissent rapidement :</a:t>
             </a:r>
           </a:p>
           <a:p>
             <a:pPr algn="ctr"/>
-            <a:endParaRPr lang="fr-FR" u="sng" dirty="0" smtClean="0"/>
+            <a:endParaRPr lang="fr-FR" u="sng" dirty="0"/>
           </a:p>
           <a:p>
             <a:pPr algn="ctr"/>
             <a:r>
-              <a:rPr lang="fr-FR" dirty="0" smtClean="0"/>
+              <a:rPr lang="fr-FR" dirty="0"/>
               <a:t>- </a:t>
             </a:r>
             <a:r>
-              <a:rPr lang="fr-FR" u="sng" dirty="0" smtClean="0">
+              <a:rPr lang="fr-FR" u="sng" dirty="0">
                 <a:effectLst>
                   <a:outerShdw blurRad="38100" dist="38100" dir="2700000" algn="tl">
                     <a:srgbClr val="000000">
@@ -5403,7 +5286,7 @@
               <a:t>Absence d’internet </a:t>
             </a:r>
             <a:r>
-              <a:rPr lang="fr-FR" dirty="0" smtClean="0"/>
+              <a:rPr lang="fr-FR" dirty="0"/>
               <a:t>dans le cheminement des données (utilisation d’un réseau maillé).</a:t>
             </a:r>
           </a:p>
@@ -5413,7 +5296,7 @@
               <a:buChar char="-"/>
             </a:pPr>
             <a:r>
-              <a:rPr lang="fr-FR" u="sng" dirty="0" smtClean="0">
+              <a:rPr lang="fr-FR" u="sng" dirty="0">
                 <a:effectLst>
                   <a:outerShdw blurRad="38100" dist="38100" dir="2700000" algn="tl">
                     <a:srgbClr val="000000">
@@ -5425,7 +5308,7 @@
               <a:t>Contrainte de coût </a:t>
             </a:r>
             <a:r>
-              <a:rPr lang="fr-FR" dirty="0" smtClean="0"/>
+              <a:rPr lang="fr-FR" dirty="0"/>
               <a:t>-&gt; Carte ne comportant pas d’OS, ce qui empêche l’utilisation du PHP et donc des bases de données.</a:t>
             </a:r>
           </a:p>
@@ -5435,7 +5318,7 @@
               <a:buChar char="-"/>
             </a:pPr>
             <a:r>
-              <a:rPr lang="fr-FR" u="sng" dirty="0" smtClean="0">
+              <a:rPr lang="fr-FR" u="sng" dirty="0">
                 <a:effectLst>
                   <a:outerShdw blurRad="38100" dist="38100" dir="2700000" algn="tl">
                     <a:srgbClr val="000000">
@@ -5447,7 +5330,7 @@
               <a:t>Stockage des données dans une carte SD</a:t>
             </a:r>
             <a:r>
-              <a:rPr lang="fr-FR" dirty="0" smtClean="0"/>
+              <a:rPr lang="fr-FR" dirty="0"/>
               <a:t> et produire un historique consultable par l’agriculteur depuis un site Web.</a:t>
             </a:r>
           </a:p>
@@ -5507,15 +5390,7 @@
                   <a:srgbClr val="FF0000"/>
                 </a:solidFill>
               </a:rPr>
-              <a:t>B</a:t>
-            </a:r>
-            <a:r>
-              <a:rPr lang="fr-FR" sz="4000" dirty="0" smtClean="0">
-                <a:solidFill>
-                  <a:srgbClr val="FF0000"/>
-                </a:solidFill>
-              </a:rPr>
-              <a:t>) Contraintes :</a:t>
+              <a:t>B) Contraintes :</a:t>
             </a:r>
             <a:endParaRPr lang="fr-FR" sz="4000" dirty="0"/>
           </a:p>
@@ -5692,13 +5567,6 @@
   <p:clrMapOvr>
     <a:masterClrMapping/>
   </p:clrMapOvr>
-  <p:timing>
-    <p:tnLst>
-      <p:par>
-        <p:cTn id="1" dur="indefinite" restart="never" nodeType="tmRoot"/>
-      </p:par>
-    </p:tnLst>
-  </p:timing>
 </p:sld>
 </file>
 
@@ -5760,7 +5628,7 @@
                 <a:spcPct val="100000"/>
               </a:lnSpc>
             </a:pPr>
-            <a:endParaRPr lang="fr-FR" sz="2000" u="sng" dirty="0" smtClean="0"/>
+            <a:endParaRPr lang="fr-FR" sz="2000" u="sng" dirty="0"/>
           </a:p>
           <a:p>
             <a:pPr algn="l">
@@ -5776,7 +5644,7 @@
                 <a:spcPct val="100000"/>
               </a:lnSpc>
             </a:pPr>
-            <a:endParaRPr lang="fr-FR" sz="2000" u="sng" dirty="0" smtClean="0"/>
+            <a:endParaRPr lang="fr-FR" sz="2000" u="sng" dirty="0"/>
           </a:p>
         </p:txBody>
       </p:sp>
@@ -5822,14 +5690,14 @@
           <a:p>
             <a:pPr algn="ctr"/>
             <a:r>
-              <a:rPr lang="fr-FR" dirty="0" smtClean="0"/>
+              <a:rPr lang="fr-FR" dirty="0"/>
               <a:t>Ce projet est évolutif car il est supposé être effectué sur plusieurs années par les étudiants.</a:t>
             </a:r>
           </a:p>
           <a:p>
             <a:pPr algn="ctr"/>
             <a:r>
-              <a:rPr lang="fr-FR" dirty="0" smtClean="0"/>
+              <a:rPr lang="fr-FR" dirty="0"/>
               <a:t>Cependant, nous sommes les premiers à le faire, c’est pour cela que nous devons tout bâtir de zéro, que ce soit dans :</a:t>
             </a:r>
           </a:p>
@@ -5839,7 +5707,7 @@
               <a:buChar char="-"/>
             </a:pPr>
             <a:r>
-              <a:rPr lang="fr-FR" dirty="0" smtClean="0"/>
+              <a:rPr lang="fr-FR" dirty="0"/>
               <a:t>Le montage et  le codage des diverses sondes </a:t>
             </a:r>
           </a:p>
@@ -5849,7 +5717,7 @@
               <a:buChar char="-"/>
             </a:pPr>
             <a:r>
-              <a:rPr lang="fr-FR" dirty="0" smtClean="0"/>
+              <a:rPr lang="fr-FR" dirty="0"/>
               <a:t>Le site internet composé de 3 langages : HTML / CSS / JS</a:t>
             </a:r>
           </a:p>
@@ -5859,14 +5727,14 @@
               <a:buChar char="-"/>
             </a:pPr>
             <a:r>
-              <a:rPr lang="fr-FR" dirty="0" smtClean="0"/>
+              <a:rPr lang="fr-FR" dirty="0"/>
               <a:t>La mise en place du réseau maillé</a:t>
             </a:r>
           </a:p>
           <a:p>
             <a:pPr algn="ctr"/>
             <a:r>
-              <a:rPr lang="fr-FR" dirty="0" smtClean="0"/>
+              <a:rPr lang="fr-FR" dirty="0"/>
               <a:t>- La création de l’application de configuration des sondes sur terminal Android.</a:t>
             </a:r>
           </a:p>
@@ -5926,15 +5794,7 @@
                   <a:srgbClr val="FF0000"/>
                 </a:solidFill>
               </a:rPr>
-              <a:t>C</a:t>
-            </a:r>
-            <a:r>
-              <a:rPr lang="fr-FR" sz="4000" dirty="0" smtClean="0">
-                <a:solidFill>
-                  <a:srgbClr val="FF0000"/>
-                </a:solidFill>
-              </a:rPr>
-              <a:t>) Point de départ du projet :</a:t>
+              <a:t>C) Point de départ du projet :</a:t>
             </a:r>
             <a:endParaRPr lang="fr-FR" sz="4000" dirty="0"/>
           </a:p>
@@ -5950,13 +5810,6 @@
   <p:clrMapOvr>
     <a:masterClrMapping/>
   </p:clrMapOvr>
-  <p:timing>
-    <p:tnLst>
-      <p:par>
-        <p:cTn id="1" dur="indefinite" restart="never" nodeType="tmRoot"/>
-      </p:par>
-    </p:tnLst>
-  </p:timing>
 </p:sld>
 </file>
 
@@ -6048,20 +5901,12 @@
           <a:p>
             <a:pPr algn="ctr"/>
             <a:r>
-              <a:rPr lang="fr-FR" sz="4000" dirty="0" smtClean="0">
+              <a:rPr lang="fr-FR" sz="4000" dirty="0">
                 <a:solidFill>
                   <a:srgbClr val="FF0000"/>
                 </a:solidFill>
               </a:rPr>
-              <a:t>2) Diagramme de cas d’utilisation pour l’Eco-sonde</a:t>
-            </a:r>
-            <a:r>
-              <a:rPr lang="fr-FR" sz="4000" dirty="0" smtClean="0">
-                <a:solidFill>
-                  <a:srgbClr val="FF0000"/>
-                </a:solidFill>
-              </a:rPr>
-              <a:t>:</a:t>
+              <a:t>2) Diagramme de cas d’utilisation pour l’Eco-sonde:</a:t>
             </a:r>
             <a:endParaRPr lang="fr-FR" sz="4000" dirty="0"/>
           </a:p>
@@ -6107,13 +5952,6 @@
   <p:clrMapOvr>
     <a:masterClrMapping/>
   </p:clrMapOvr>
-  <p:timing>
-    <p:tnLst>
-      <p:par>
-        <p:cTn id="1" dur="indefinite" restart="never" nodeType="tmRoot"/>
-      </p:par>
-    </p:tnLst>
-  </p:timing>
 </p:sld>
 </file>
 
@@ -6205,28 +6043,12 @@
           <a:p>
             <a:pPr algn="ctr"/>
             <a:r>
-              <a:rPr lang="fr-FR" sz="4000" dirty="0" smtClean="0">
-                <a:solidFill>
-                  <a:srgbClr val="FF0000"/>
-                </a:solidFill>
-              </a:rPr>
-              <a:t>2) Diagramme de </a:t>
-            </a:r>
-            <a:r>
               <a:rPr lang="fr-FR" sz="4000" dirty="0">
                 <a:solidFill>
                   <a:srgbClr val="FF0000"/>
                 </a:solidFill>
               </a:rPr>
-              <a:t>cas d’utilisation pour l’Eco-sonde </a:t>
-            </a:r>
-            <a:r>
-              <a:rPr lang="fr-FR" sz="4000" dirty="0" smtClean="0">
-                <a:solidFill>
-                  <a:srgbClr val="FF0000"/>
-                </a:solidFill>
-              </a:rPr>
-              <a:t>du site:</a:t>
+              <a:t>2) Diagramme de cas d’utilisation pour l’Eco-sonde du site:</a:t>
             </a:r>
             <a:endParaRPr lang="fr-FR" sz="4000" dirty="0"/>
           </a:p>
@@ -6272,13 +6094,6 @@
   <p:clrMapOvr>
     <a:masterClrMapping/>
   </p:clrMapOvr>
-  <p:timing>
-    <p:tnLst>
-      <p:par>
-        <p:cTn id="1" dur="indefinite" restart="never" nodeType="tmRoot"/>
-      </p:par>
-    </p:tnLst>
-  </p:timing>
 </p:sld>
 </file>
 
@@ -6370,28 +6185,12 @@
           <a:p>
             <a:pPr algn="ctr"/>
             <a:r>
-              <a:rPr lang="fr-FR" sz="4000" dirty="0" smtClean="0">
-                <a:solidFill>
-                  <a:srgbClr val="FF0000"/>
-                </a:solidFill>
-              </a:rPr>
-              <a:t>2) Diagramme de </a:t>
-            </a:r>
-            <a:r>
               <a:rPr lang="fr-FR" sz="4000" dirty="0">
                 <a:solidFill>
                   <a:srgbClr val="FF0000"/>
                 </a:solidFill>
               </a:rPr>
-              <a:t>cas d’utilisation pour l’Eco-sonde </a:t>
-            </a:r>
-            <a:r>
-              <a:rPr lang="fr-FR" sz="4000" dirty="0" smtClean="0">
-                <a:solidFill>
-                  <a:srgbClr val="FF0000"/>
-                </a:solidFill>
-              </a:rPr>
-              <a:t>du concentrateur:</a:t>
+              <a:t>2) Diagramme de cas d’utilisation pour l’Eco-sonde du concentrateur:</a:t>
             </a:r>
             <a:endParaRPr lang="fr-FR" sz="4000" dirty="0"/>
           </a:p>
@@ -6437,13 +6236,6 @@
   <p:clrMapOvr>
     <a:masterClrMapping/>
   </p:clrMapOvr>
-  <p:timing>
-    <p:tnLst>
-      <p:par>
-        <p:cTn id="1" dur="indefinite" restart="never" nodeType="tmRoot"/>
-      </p:par>
-    </p:tnLst>
-  </p:timing>
 </p:sld>
 </file>
 

</xml_diff>